<commit_message>
Dataset Modified with ordered classes
</commit_message>
<xml_diff>
--- a/Connected Vehicles.pptx
+++ b/Connected Vehicles.pptx
@@ -249,7 +249,7 @@
           <a:p>
             <a:fld id="{DC6FD307-99A3-48DA-A14C-5765423103A6}" type="datetimeFigureOut">
               <a:rPr lang="en-US" smtClean="0"/>
-              <a:t>6/23/2021</a:t>
+              <a:t>6/25/2021</a:t>
             </a:fld>
             <a:endParaRPr lang="en-US"/>
           </a:p>
@@ -419,7 +419,7 @@
           <a:p>
             <a:fld id="{DC6FD307-99A3-48DA-A14C-5765423103A6}" type="datetimeFigureOut">
               <a:rPr lang="en-US" smtClean="0"/>
-              <a:t>6/23/2021</a:t>
+              <a:t>6/25/2021</a:t>
             </a:fld>
             <a:endParaRPr lang="en-US"/>
           </a:p>
@@ -599,7 +599,7 @@
           <a:p>
             <a:fld id="{DC6FD307-99A3-48DA-A14C-5765423103A6}" type="datetimeFigureOut">
               <a:rPr lang="en-US" smtClean="0"/>
-              <a:t>6/23/2021</a:t>
+              <a:t>6/25/2021</a:t>
             </a:fld>
             <a:endParaRPr lang="en-US"/>
           </a:p>
@@ -769,7 +769,7 @@
           <a:p>
             <a:fld id="{DC6FD307-99A3-48DA-A14C-5765423103A6}" type="datetimeFigureOut">
               <a:rPr lang="en-US" smtClean="0"/>
-              <a:t>6/23/2021</a:t>
+              <a:t>6/25/2021</a:t>
             </a:fld>
             <a:endParaRPr lang="en-US"/>
           </a:p>
@@ -1015,7 +1015,7 @@
           <a:p>
             <a:fld id="{DC6FD307-99A3-48DA-A14C-5765423103A6}" type="datetimeFigureOut">
               <a:rPr lang="en-US" smtClean="0"/>
-              <a:t>6/23/2021</a:t>
+              <a:t>6/25/2021</a:t>
             </a:fld>
             <a:endParaRPr lang="en-US"/>
           </a:p>
@@ -1247,7 +1247,7 @@
           <a:p>
             <a:fld id="{DC6FD307-99A3-48DA-A14C-5765423103A6}" type="datetimeFigureOut">
               <a:rPr lang="en-US" smtClean="0"/>
-              <a:t>6/23/2021</a:t>
+              <a:t>6/25/2021</a:t>
             </a:fld>
             <a:endParaRPr lang="en-US"/>
           </a:p>
@@ -1614,7 +1614,7 @@
           <a:p>
             <a:fld id="{DC6FD307-99A3-48DA-A14C-5765423103A6}" type="datetimeFigureOut">
               <a:rPr lang="en-US" smtClean="0"/>
-              <a:t>6/23/2021</a:t>
+              <a:t>6/25/2021</a:t>
             </a:fld>
             <a:endParaRPr lang="en-US"/>
           </a:p>
@@ -1732,7 +1732,7 @@
           <a:p>
             <a:fld id="{DC6FD307-99A3-48DA-A14C-5765423103A6}" type="datetimeFigureOut">
               <a:rPr lang="en-US" smtClean="0"/>
-              <a:t>6/23/2021</a:t>
+              <a:t>6/25/2021</a:t>
             </a:fld>
             <a:endParaRPr lang="en-US"/>
           </a:p>
@@ -1827,7 +1827,7 @@
           <a:p>
             <a:fld id="{DC6FD307-99A3-48DA-A14C-5765423103A6}" type="datetimeFigureOut">
               <a:rPr lang="en-US" smtClean="0"/>
-              <a:t>6/23/2021</a:t>
+              <a:t>6/25/2021</a:t>
             </a:fld>
             <a:endParaRPr lang="en-US"/>
           </a:p>
@@ -2104,7 +2104,7 @@
           <a:p>
             <a:fld id="{DC6FD307-99A3-48DA-A14C-5765423103A6}" type="datetimeFigureOut">
               <a:rPr lang="en-US" smtClean="0"/>
-              <a:t>6/23/2021</a:t>
+              <a:t>6/25/2021</a:t>
             </a:fld>
             <a:endParaRPr lang="en-US"/>
           </a:p>
@@ -2357,7 +2357,7 @@
           <a:p>
             <a:fld id="{DC6FD307-99A3-48DA-A14C-5765423103A6}" type="datetimeFigureOut">
               <a:rPr lang="en-US" smtClean="0"/>
-              <a:t>6/23/2021</a:t>
+              <a:t>6/25/2021</a:t>
             </a:fld>
             <a:endParaRPr lang="en-US"/>
           </a:p>
@@ -2570,7 +2570,7 @@
           <a:p>
             <a:fld id="{DC6FD307-99A3-48DA-A14C-5765423103A6}" type="datetimeFigureOut">
               <a:rPr lang="en-US" smtClean="0"/>
-              <a:t>6/23/2021</a:t>
+              <a:t>6/25/2021</a:t>
             </a:fld>
             <a:endParaRPr lang="en-US"/>
           </a:p>
@@ -3012,22 +3012,108 @@
         </p:nvSpPr>
         <p:spPr>
           <a:xfrm>
-            <a:off x="1524000" y="4146984"/>
-            <a:ext cx="9144000" cy="1655762"/>
-          </a:xfrm>
-        </p:spPr>
-        <p:txBody>
-          <a:bodyPr/>
+            <a:off x="1524000" y="3676073"/>
+            <a:ext cx="9144000" cy="2126673"/>
+          </a:xfrm>
+        </p:spPr>
+        <p:txBody>
+          <a:bodyPr>
+            <a:normAutofit/>
+          </a:bodyPr>
           <a:lstStyle/>
           <a:p>
             <a:r>
               <a:rPr lang="en-US" dirty="0" smtClean="0"/>
-              <a:t>CSE616: Neural Network Project</a:t>
+              <a:t>Mohamed Saied</a:t>
+            </a:r>
+          </a:p>
+          <a:p>
+            <a:r>
+              <a:rPr lang="en-US" dirty="0" smtClean="0"/>
+              <a:t>Under Supervision of </a:t>
+            </a:r>
+          </a:p>
+          <a:p>
+            <a:r>
+              <a:rPr lang="en-US" dirty="0" smtClean="0"/>
+              <a:t>Prof. </a:t>
+            </a:r>
+            <a:r>
+              <a:rPr lang="en-US" dirty="0" err="1" smtClean="0"/>
+              <a:t>Dr</a:t>
+            </a:r>
+            <a:r>
+              <a:rPr lang="en-US" dirty="0" smtClean="0"/>
+              <a:t> </a:t>
+            </a:r>
+            <a:r>
+              <a:rPr lang="en-US" dirty="0" err="1" smtClean="0"/>
+              <a:t>Hoda</a:t>
+            </a:r>
+            <a:r>
+              <a:rPr lang="en-US" dirty="0" smtClean="0"/>
+              <a:t> </a:t>
+            </a:r>
+            <a:r>
+              <a:rPr lang="en-US" dirty="0" err="1" smtClean="0"/>
+              <a:t>Korashy</a:t>
+            </a:r>
+            <a:endParaRPr lang="en-US" dirty="0" smtClean="0"/>
+          </a:p>
+          <a:p>
+            <a:r>
+              <a:rPr lang="en-US" dirty="0" err="1" smtClean="0"/>
+              <a:t>Dr</a:t>
+            </a:r>
+            <a:r>
+              <a:rPr lang="en-US" dirty="0" smtClean="0"/>
+              <a:t> Khaled Youssef</a:t>
             </a:r>
             <a:endParaRPr lang="en-US" dirty="0"/>
           </a:p>
         </p:txBody>
       </p:sp>
+      <p:pic>
+        <p:nvPicPr>
+          <p:cNvPr id="4" name="Picture 2" descr="ASU | Home"/>
+          <p:cNvPicPr>
+            <a:picLocks noChangeAspect="1" noChangeArrowheads="1"/>
+          </p:cNvPicPr>
+          <p:nvPr/>
+        </p:nvPicPr>
+        <p:blipFill>
+          <a:blip r:embed="rId2">
+            <a:extLst>
+              <a:ext uri="{28A0092B-C50C-407E-A947-70E740481C1C}">
+                <a14:useLocalDpi xmlns:a14="http://schemas.microsoft.com/office/drawing/2010/main" val="0"/>
+              </a:ext>
+            </a:extLst>
+          </a:blip>
+          <a:srcRect/>
+          <a:stretch>
+            <a:fillRect/>
+          </a:stretch>
+        </p:blipFill>
+        <p:spPr bwMode="auto">
+          <a:xfrm>
+            <a:off x="11083635" y="113794"/>
+            <a:ext cx="989157" cy="989157"/>
+          </a:xfrm>
+          <a:prstGeom prst="rect">
+            <a:avLst/>
+          </a:prstGeom>
+          <a:noFill/>
+          <a:extLst>
+            <a:ext uri="{909E8E84-426E-40DD-AFC4-6F175D3DCCD1}">
+              <a14:hiddenFill xmlns:a14="http://schemas.microsoft.com/office/drawing/2010/main">
+                <a:solidFill>
+                  <a:srgbClr val="FFFFFF"/>
+                </a:solidFill>
+              </a14:hiddenFill>
+            </a:ext>
+          </a:extLst>
+        </p:spPr>
+      </p:pic>
     </p:spTree>
     <p:extLst>
       <p:ext uri="{BB962C8B-B14F-4D97-AF65-F5344CB8AC3E}">
@@ -3231,6 +3317,47 @@
           </a:p>
         </p:txBody>
       </p:sp>
+      <p:pic>
+        <p:nvPicPr>
+          <p:cNvPr id="6" name="Picture 2" descr="ASU | Home"/>
+          <p:cNvPicPr>
+            <a:picLocks noChangeAspect="1" noChangeArrowheads="1"/>
+          </p:cNvPicPr>
+          <p:nvPr/>
+        </p:nvPicPr>
+        <p:blipFill>
+          <a:blip r:embed="rId3">
+            <a:extLst>
+              <a:ext uri="{28A0092B-C50C-407E-A947-70E740481C1C}">
+                <a14:useLocalDpi xmlns:a14="http://schemas.microsoft.com/office/drawing/2010/main" val="0"/>
+              </a:ext>
+            </a:extLst>
+          </a:blip>
+          <a:srcRect/>
+          <a:stretch>
+            <a:fillRect/>
+          </a:stretch>
+        </p:blipFill>
+        <p:spPr bwMode="auto">
+          <a:xfrm>
+            <a:off x="11083635" y="113794"/>
+            <a:ext cx="989157" cy="989157"/>
+          </a:xfrm>
+          <a:prstGeom prst="rect">
+            <a:avLst/>
+          </a:prstGeom>
+          <a:noFill/>
+          <a:extLst>
+            <a:ext uri="{909E8E84-426E-40DD-AFC4-6F175D3DCCD1}">
+              <a14:hiddenFill xmlns:a14="http://schemas.microsoft.com/office/drawing/2010/main">
+                <a:solidFill>
+                  <a:srgbClr val="FFFFFF"/>
+                </a:solidFill>
+              </a14:hiddenFill>
+            </a:ext>
+          </a:extLst>
+        </p:spPr>
+      </p:pic>
     </p:spTree>
     <p:extLst>
       <p:ext uri="{BB962C8B-B14F-4D97-AF65-F5344CB8AC3E}">
@@ -3311,11 +3438,7 @@
           <a:p>
             <a:r>
               <a:rPr lang="en-US" dirty="0" smtClean="0"/>
-              <a:t>In this project we demonstrate 6 types of </a:t>
-            </a:r>
-            <a:r>
-              <a:rPr lang="en-US" dirty="0" smtClean="0"/>
-              <a:t>attack using </a:t>
+              <a:t>In this project we demonstrate 6 types of attack using </a:t>
             </a:r>
             <a:r>
               <a:rPr lang="en-US" dirty="0" err="1" smtClean="0"/>
@@ -3392,6 +3515,47 @@
           <a:prstGeom prst="rect">
             <a:avLst/>
           </a:prstGeom>
+        </p:spPr>
+      </p:pic>
+      <p:pic>
+        <p:nvPicPr>
+          <p:cNvPr id="6" name="Picture 2" descr="ASU | Home"/>
+          <p:cNvPicPr>
+            <a:picLocks noChangeAspect="1" noChangeArrowheads="1"/>
+          </p:cNvPicPr>
+          <p:nvPr/>
+        </p:nvPicPr>
+        <p:blipFill>
+          <a:blip r:embed="rId4">
+            <a:extLst>
+              <a:ext uri="{28A0092B-C50C-407E-A947-70E740481C1C}">
+                <a14:useLocalDpi xmlns:a14="http://schemas.microsoft.com/office/drawing/2010/main" val="0"/>
+              </a:ext>
+            </a:extLst>
+          </a:blip>
+          <a:srcRect/>
+          <a:stretch>
+            <a:fillRect/>
+          </a:stretch>
+        </p:blipFill>
+        <p:spPr bwMode="auto">
+          <a:xfrm>
+            <a:off x="11083635" y="113794"/>
+            <a:ext cx="989157" cy="989157"/>
+          </a:xfrm>
+          <a:prstGeom prst="rect">
+            <a:avLst/>
+          </a:prstGeom>
+          <a:noFill/>
+          <a:extLst>
+            <a:ext uri="{909E8E84-426E-40DD-AFC4-6F175D3DCCD1}">
+              <a14:hiddenFill xmlns:a14="http://schemas.microsoft.com/office/drawing/2010/main">
+                <a:solidFill>
+                  <a:srgbClr val="FFFFFF"/>
+                </a:solidFill>
+              </a14:hiddenFill>
+            </a:ext>
+          </a:extLst>
         </p:spPr>
       </p:pic>
     </p:spTree>
@@ -3469,13 +3633,8 @@
           <a:p>
             <a:r>
               <a:rPr lang="en-US" dirty="0" smtClean="0"/>
-              <a:t>Multi-Layer Perceptron is </a:t>
-            </a:r>
-            <a:r>
-              <a:rPr lang="en-US" dirty="0" smtClean="0"/>
-              <a:t>used with 4 inputs and 6 outputs</a:t>
-            </a:r>
-            <a:endParaRPr lang="en-US" dirty="0" smtClean="0"/>
+              <a:t>Multi-Layer Perceptron is used with 4 inputs and 6 outputs</a:t>
+            </a:r>
           </a:p>
           <a:p>
             <a:endParaRPr lang="en-US" dirty="0"/>
@@ -3540,6 +3699,47 @@
           <a:xfrm>
             <a:off x="6591400" y="3602182"/>
             <a:ext cx="3211845" cy="921760"/>
+          </a:xfrm>
+          <a:prstGeom prst="rect">
+            <a:avLst/>
+          </a:prstGeom>
+          <a:noFill/>
+          <a:extLst>
+            <a:ext uri="{909E8E84-426E-40DD-AFC4-6F175D3DCCD1}">
+              <a14:hiddenFill xmlns:a14="http://schemas.microsoft.com/office/drawing/2010/main">
+                <a:solidFill>
+                  <a:srgbClr val="FFFFFF"/>
+                </a:solidFill>
+              </a14:hiddenFill>
+            </a:ext>
+          </a:extLst>
+        </p:spPr>
+      </p:pic>
+      <p:pic>
+        <p:nvPicPr>
+          <p:cNvPr id="6" name="Picture 2" descr="ASU | Home"/>
+          <p:cNvPicPr>
+            <a:picLocks noChangeAspect="1" noChangeArrowheads="1"/>
+          </p:cNvPicPr>
+          <p:nvPr/>
+        </p:nvPicPr>
+        <p:blipFill>
+          <a:blip r:embed="rId3">
+            <a:extLst>
+              <a:ext uri="{28A0092B-C50C-407E-A947-70E740481C1C}">
+                <a14:useLocalDpi xmlns:a14="http://schemas.microsoft.com/office/drawing/2010/main" val="0"/>
+              </a:ext>
+            </a:extLst>
+          </a:blip>
+          <a:srcRect/>
+          <a:stretch>
+            <a:fillRect/>
+          </a:stretch>
+        </p:blipFill>
+        <p:spPr bwMode="auto">
+          <a:xfrm>
+            <a:off x="11083635" y="113794"/>
+            <a:ext cx="989157" cy="989157"/>
           </a:xfrm>
           <a:prstGeom prst="rect">
             <a:avLst/>
@@ -3967,6 +4167,47 @@
           </a:p>
         </p:txBody>
       </p:sp>
+      <p:pic>
+        <p:nvPicPr>
+          <p:cNvPr id="13" name="Picture 2" descr="ASU | Home"/>
+          <p:cNvPicPr>
+            <a:picLocks noChangeAspect="1" noChangeArrowheads="1"/>
+          </p:cNvPicPr>
+          <p:nvPr/>
+        </p:nvPicPr>
+        <p:blipFill>
+          <a:blip r:embed="rId2">
+            <a:extLst>
+              <a:ext uri="{28A0092B-C50C-407E-A947-70E740481C1C}">
+                <a14:useLocalDpi xmlns:a14="http://schemas.microsoft.com/office/drawing/2010/main" val="0"/>
+              </a:ext>
+            </a:extLst>
+          </a:blip>
+          <a:srcRect/>
+          <a:stretch>
+            <a:fillRect/>
+          </a:stretch>
+        </p:blipFill>
+        <p:spPr bwMode="auto">
+          <a:xfrm>
+            <a:off x="11083635" y="113794"/>
+            <a:ext cx="989157" cy="989157"/>
+          </a:xfrm>
+          <a:prstGeom prst="rect">
+            <a:avLst/>
+          </a:prstGeom>
+          <a:noFill/>
+          <a:extLst>
+            <a:ext uri="{909E8E84-426E-40DD-AFC4-6F175D3DCCD1}">
+              <a14:hiddenFill xmlns:a14="http://schemas.microsoft.com/office/drawing/2010/main">
+                <a:solidFill>
+                  <a:srgbClr val="FFFFFF"/>
+                </a:solidFill>
+              </a14:hiddenFill>
+            </a:ext>
+          </a:extLst>
+        </p:spPr>
+      </p:pic>
     </p:spTree>
     <p:extLst>
       <p:ext uri="{BB962C8B-B14F-4D97-AF65-F5344CB8AC3E}">
@@ -4088,6 +4329,47 @@
           <a:ln>
             <a:noFill/>
           </a:ln>
+        </p:spPr>
+      </p:pic>
+      <p:pic>
+        <p:nvPicPr>
+          <p:cNvPr id="5" name="Picture 2" descr="ASU | Home"/>
+          <p:cNvPicPr>
+            <a:picLocks noChangeAspect="1" noChangeArrowheads="1"/>
+          </p:cNvPicPr>
+          <p:nvPr/>
+        </p:nvPicPr>
+        <p:blipFill>
+          <a:blip r:embed="rId3">
+            <a:extLst>
+              <a:ext uri="{28A0092B-C50C-407E-A947-70E740481C1C}">
+                <a14:useLocalDpi xmlns:a14="http://schemas.microsoft.com/office/drawing/2010/main" val="0"/>
+              </a:ext>
+            </a:extLst>
+          </a:blip>
+          <a:srcRect/>
+          <a:stretch>
+            <a:fillRect/>
+          </a:stretch>
+        </p:blipFill>
+        <p:spPr bwMode="auto">
+          <a:xfrm>
+            <a:off x="11083635" y="113794"/>
+            <a:ext cx="989157" cy="989157"/>
+          </a:xfrm>
+          <a:prstGeom prst="rect">
+            <a:avLst/>
+          </a:prstGeom>
+          <a:noFill/>
+          <a:extLst>
+            <a:ext uri="{909E8E84-426E-40DD-AFC4-6F175D3DCCD1}">
+              <a14:hiddenFill xmlns:a14="http://schemas.microsoft.com/office/drawing/2010/main">
+                <a:solidFill>
+                  <a:srgbClr val="FFFFFF"/>
+                </a:solidFill>
+              </a14:hiddenFill>
+            </a:ext>
+          </a:extLst>
         </p:spPr>
       </p:pic>
     </p:spTree>
@@ -4237,6 +4519,47 @@
           <a:ln>
             <a:noFill/>
           </a:ln>
+        </p:spPr>
+      </p:pic>
+      <p:pic>
+        <p:nvPicPr>
+          <p:cNvPr id="5" name="Picture 2" descr="ASU | Home"/>
+          <p:cNvPicPr>
+            <a:picLocks noChangeAspect="1" noChangeArrowheads="1"/>
+          </p:cNvPicPr>
+          <p:nvPr/>
+        </p:nvPicPr>
+        <p:blipFill>
+          <a:blip r:embed="rId3">
+            <a:extLst>
+              <a:ext uri="{28A0092B-C50C-407E-A947-70E740481C1C}">
+                <a14:useLocalDpi xmlns:a14="http://schemas.microsoft.com/office/drawing/2010/main" val="0"/>
+              </a:ext>
+            </a:extLst>
+          </a:blip>
+          <a:srcRect/>
+          <a:stretch>
+            <a:fillRect/>
+          </a:stretch>
+        </p:blipFill>
+        <p:spPr bwMode="auto">
+          <a:xfrm>
+            <a:off x="11083635" y="113794"/>
+            <a:ext cx="989157" cy="989157"/>
+          </a:xfrm>
+          <a:prstGeom prst="rect">
+            <a:avLst/>
+          </a:prstGeom>
+          <a:noFill/>
+          <a:extLst>
+            <a:ext uri="{909E8E84-426E-40DD-AFC4-6F175D3DCCD1}">
+              <a14:hiddenFill xmlns:a14="http://schemas.microsoft.com/office/drawing/2010/main">
+                <a:solidFill>
+                  <a:srgbClr val="FFFFFF"/>
+                </a:solidFill>
+              </a14:hiddenFill>
+            </a:ext>
+          </a:extLst>
         </p:spPr>
       </p:pic>
     </p:spTree>

</xml_diff>